<commit_message>
Präsi: USE CASE Diagram angepasst
</commit_message>
<xml_diff>
--- a/Doku/Dokumentation/Fabian Doku & Präsi/Präsi Fabian.pptx
+++ b/Doku/Dokumentation/Fabian Doku & Präsi/Präsi Fabian.pptx
@@ -200,7 +200,7 @@
           <a:p>
             <a:fld id="{3C5C1F87-A553-D54A-8D92-982D0D8B1973}" type="datetime1">
               <a:rPr lang="de-DE" smtClean="0"/>
-              <a:t>30.07.15</a:t>
+              <a:t>01.08.15</a:t>
             </a:fld>
             <a:endParaRPr lang="de-DE"/>
           </a:p>
@@ -366,7 +366,7 @@
           <a:p>
             <a:fld id="{5EBEB032-4C8F-D14A-8C9D-7EF290BC175F}" type="datetime1">
               <a:rPr lang="de-DE" smtClean="0"/>
-              <a:t>30.07.15</a:t>
+              <a:t>01.08.15</a:t>
             </a:fld>
             <a:endParaRPr lang="de-DE"/>
           </a:p>
@@ -1236,7 +1236,7 @@
           <a:p>
             <a:fld id="{1C409EFA-92D1-2F45-84E5-8C09624895D8}" type="datetime1">
               <a:rPr lang="de-DE" smtClean="0"/>
-              <a:t>30.07.15</a:t>
+              <a:t>01.08.15</a:t>
             </a:fld>
             <a:endParaRPr lang="de-DE"/>
           </a:p>
@@ -1406,7 +1406,7 @@
           <a:p>
             <a:fld id="{CC9C6B11-0577-8246-A3BA-B300B0F499A5}" type="datetime1">
               <a:rPr lang="de-DE" smtClean="0"/>
-              <a:t>30.07.15</a:t>
+              <a:t>01.08.15</a:t>
             </a:fld>
             <a:endParaRPr lang="de-DE"/>
           </a:p>
@@ -1586,7 +1586,7 @@
           <a:p>
             <a:fld id="{6902ABF9-E8A2-8E4D-B50D-9137CB1F6782}" type="datetime1">
               <a:rPr lang="de-DE" smtClean="0"/>
-              <a:t>30.07.15</a:t>
+              <a:t>01.08.15</a:t>
             </a:fld>
             <a:endParaRPr lang="de-DE"/>
           </a:p>
@@ -1756,7 +1756,7 @@
           <a:p>
             <a:fld id="{A2C708EA-969E-8C41-86B2-F6AEDE275753}" type="datetime1">
               <a:rPr lang="de-DE" smtClean="0"/>
-              <a:t>30.07.15</a:t>
+              <a:t>01.08.15</a:t>
             </a:fld>
             <a:endParaRPr lang="de-DE"/>
           </a:p>
@@ -2002,7 +2002,7 @@
           <a:p>
             <a:fld id="{AEAE3140-3677-294F-BB1A-0172ED5847FC}" type="datetime1">
               <a:rPr lang="de-DE" smtClean="0"/>
-              <a:t>30.07.15</a:t>
+              <a:t>01.08.15</a:t>
             </a:fld>
             <a:endParaRPr lang="de-DE"/>
           </a:p>
@@ -2290,7 +2290,7 @@
           <a:p>
             <a:fld id="{1ACAACC3-F3C9-824E-B495-1FDE64EF99BD}" type="datetime1">
               <a:rPr lang="de-DE" smtClean="0"/>
-              <a:t>30.07.15</a:t>
+              <a:t>01.08.15</a:t>
             </a:fld>
             <a:endParaRPr lang="de-DE"/>
           </a:p>
@@ -2712,7 +2712,7 @@
           <a:p>
             <a:fld id="{71DB1126-796D-D447-B9E8-151D005B0148}" type="datetime1">
               <a:rPr lang="de-DE" smtClean="0"/>
-              <a:t>30.07.15</a:t>
+              <a:t>01.08.15</a:t>
             </a:fld>
             <a:endParaRPr lang="de-DE"/>
           </a:p>
@@ -2830,7 +2830,7 @@
           <a:p>
             <a:fld id="{4CF1641E-36A7-7A48-BECA-119086F567EF}" type="datetime1">
               <a:rPr lang="de-DE" smtClean="0"/>
-              <a:t>30.07.15</a:t>
+              <a:t>01.08.15</a:t>
             </a:fld>
             <a:endParaRPr lang="de-DE"/>
           </a:p>
@@ -2925,7 +2925,7 @@
           <a:p>
             <a:fld id="{35F65FC4-9A5E-7749-B2FE-88A153ECB593}" type="datetime1">
               <a:rPr lang="de-DE" smtClean="0"/>
-              <a:t>30.07.15</a:t>
+              <a:t>01.08.15</a:t>
             </a:fld>
             <a:endParaRPr lang="de-DE"/>
           </a:p>
@@ -3202,7 +3202,7 @@
           <a:p>
             <a:fld id="{B03973DD-0E77-DA46-B1C6-B169DCECB667}" type="datetime1">
               <a:rPr lang="de-DE" smtClean="0"/>
-              <a:t>30.07.15</a:t>
+              <a:t>01.08.15</a:t>
             </a:fld>
             <a:endParaRPr lang="de-DE"/>
           </a:p>
@@ -3455,7 +3455,7 @@
           <a:p>
             <a:fld id="{FDA4983A-5DE4-D64A-9ECF-D3D9C6C15267}" type="datetime1">
               <a:rPr lang="de-DE" smtClean="0"/>
-              <a:t>30.07.15</a:t>
+              <a:t>01.08.15</a:t>
             </a:fld>
             <a:endParaRPr lang="de-DE"/>
           </a:p>
@@ -3668,7 +3668,7 @@
           <a:p>
             <a:fld id="{999BCF29-3F8F-2D4D-85F8-AC23766BD627}" type="datetime1">
               <a:rPr lang="de-DE" smtClean="0"/>
-              <a:t>30.07.15</a:t>
+              <a:t>01.08.15</a:t>
             </a:fld>
             <a:endParaRPr lang="de-DE"/>
           </a:p>
@@ -5117,7 +5117,7 @@
       </p:sp>
       <p:pic>
         <p:nvPicPr>
-          <p:cNvPr id="6" name="Bild 5" descr="Umgesetzte Anforderungen.jpg"/>
+          <p:cNvPr id="4" name="Bild 3" descr="Umgesetzte Anforderungen.jpg"/>
           <p:cNvPicPr>
             <a:picLocks noChangeAspect="1"/>
           </p:cNvPicPr>
@@ -5137,8 +5137,8 @@
         </p:blipFill>
         <p:spPr>
           <a:xfrm>
-            <a:off x="452207" y="1040118"/>
-            <a:ext cx="8226353" cy="5406547"/>
+            <a:off x="526521" y="1048785"/>
+            <a:ext cx="8070637" cy="5440549"/>
           </a:xfrm>
           <a:prstGeom prst="rect">
             <a:avLst/>

</xml_diff>